<commit_message>
Update diagram to use proper terms [#6846]
git-svn-id: http://gforge.hl7.org/svn/fhir/trunk/build@6722 2f0db536-2c49-4257-a3fa-e771ed206c19
</commit_message>
<xml_diff>
--- a/guides/sdc/sdc-generic-workflow.pptx
+++ b/guides/sdc/sdc-generic-workflow.pptx
@@ -289,7 +289,7 @@
             <a:fld id="{C69E31BE-431C-4F96-86FE-0099C953F73C}" type="datetimeFigureOut">
               <a:rPr lang="en-US" smtClean="0"/>
               <a:pPr/>
-              <a:t>4/2/2015</a:t>
+              <a:t>8/28/2015</a:t>
             </a:fld>
             <a:endParaRPr lang="en-US"/>
           </a:p>
@@ -341,7 +341,7 @@
     </p:spTree>
     <p:extLst>
       <p:ext uri="{BB962C8B-B14F-4D97-AF65-F5344CB8AC3E}">
-        <p14:creationId xmlns="" xmlns:p14="http://schemas.microsoft.com/office/powerpoint/2010/main" val="2187467626"/>
+        <p14:creationId xmlns:p14="http://schemas.microsoft.com/office/powerpoint/2010/main" xmlns="" val="2187467626"/>
       </p:ext>
     </p:extLst>
   </p:cSld>
@@ -461,7 +461,7 @@
             <a:fld id="{C69E31BE-431C-4F96-86FE-0099C953F73C}" type="datetimeFigureOut">
               <a:rPr lang="en-US" smtClean="0"/>
               <a:pPr/>
-              <a:t>4/2/2015</a:t>
+              <a:t>8/28/2015</a:t>
             </a:fld>
             <a:endParaRPr lang="en-US"/>
           </a:p>
@@ -513,7 +513,7 @@
     </p:spTree>
     <p:extLst>
       <p:ext uri="{BB962C8B-B14F-4D97-AF65-F5344CB8AC3E}">
-        <p14:creationId xmlns="" xmlns:p14="http://schemas.microsoft.com/office/powerpoint/2010/main" val="790259655"/>
+        <p14:creationId xmlns:p14="http://schemas.microsoft.com/office/powerpoint/2010/main" xmlns="" val="790259655"/>
       </p:ext>
     </p:extLst>
   </p:cSld>
@@ -643,7 +643,7 @@
             <a:fld id="{C69E31BE-431C-4F96-86FE-0099C953F73C}" type="datetimeFigureOut">
               <a:rPr lang="en-US" smtClean="0"/>
               <a:pPr/>
-              <a:t>4/2/2015</a:t>
+              <a:t>8/28/2015</a:t>
             </a:fld>
             <a:endParaRPr lang="en-US"/>
           </a:p>
@@ -695,7 +695,7 @@
     </p:spTree>
     <p:extLst>
       <p:ext uri="{BB962C8B-B14F-4D97-AF65-F5344CB8AC3E}">
-        <p14:creationId xmlns="" xmlns:p14="http://schemas.microsoft.com/office/powerpoint/2010/main" val="502563980"/>
+        <p14:creationId xmlns:p14="http://schemas.microsoft.com/office/powerpoint/2010/main" xmlns="" val="502563980"/>
       </p:ext>
     </p:extLst>
   </p:cSld>
@@ -815,7 +815,7 @@
             <a:fld id="{C69E31BE-431C-4F96-86FE-0099C953F73C}" type="datetimeFigureOut">
               <a:rPr lang="en-US" smtClean="0"/>
               <a:pPr/>
-              <a:t>4/2/2015</a:t>
+              <a:t>8/28/2015</a:t>
             </a:fld>
             <a:endParaRPr lang="en-US"/>
           </a:p>
@@ -867,7 +867,7 @@
     </p:spTree>
     <p:extLst>
       <p:ext uri="{BB962C8B-B14F-4D97-AF65-F5344CB8AC3E}">
-        <p14:creationId xmlns="" xmlns:p14="http://schemas.microsoft.com/office/powerpoint/2010/main" val="4133789058"/>
+        <p14:creationId xmlns:p14="http://schemas.microsoft.com/office/powerpoint/2010/main" xmlns="" val="4133789058"/>
       </p:ext>
     </p:extLst>
   </p:cSld>
@@ -1063,7 +1063,7 @@
             <a:fld id="{C69E31BE-431C-4F96-86FE-0099C953F73C}" type="datetimeFigureOut">
               <a:rPr lang="en-US" smtClean="0"/>
               <a:pPr/>
-              <a:t>4/2/2015</a:t>
+              <a:t>8/28/2015</a:t>
             </a:fld>
             <a:endParaRPr lang="en-US"/>
           </a:p>
@@ -1115,7 +1115,7 @@
     </p:spTree>
     <p:extLst>
       <p:ext uri="{BB962C8B-B14F-4D97-AF65-F5344CB8AC3E}">
-        <p14:creationId xmlns="" xmlns:p14="http://schemas.microsoft.com/office/powerpoint/2010/main" val="458461516"/>
+        <p14:creationId xmlns:p14="http://schemas.microsoft.com/office/powerpoint/2010/main" xmlns="" val="458461516"/>
       </p:ext>
     </p:extLst>
   </p:cSld>
@@ -1353,7 +1353,7 @@
             <a:fld id="{C69E31BE-431C-4F96-86FE-0099C953F73C}" type="datetimeFigureOut">
               <a:rPr lang="en-US" smtClean="0"/>
               <a:pPr/>
-              <a:t>4/2/2015</a:t>
+              <a:t>8/28/2015</a:t>
             </a:fld>
             <a:endParaRPr lang="en-US"/>
           </a:p>
@@ -1405,7 +1405,7 @@
     </p:spTree>
     <p:extLst>
       <p:ext uri="{BB962C8B-B14F-4D97-AF65-F5344CB8AC3E}">
-        <p14:creationId xmlns="" xmlns:p14="http://schemas.microsoft.com/office/powerpoint/2010/main" val="797418400"/>
+        <p14:creationId xmlns:p14="http://schemas.microsoft.com/office/powerpoint/2010/main" xmlns="" val="797418400"/>
       </p:ext>
     </p:extLst>
   </p:cSld>
@@ -1777,7 +1777,7 @@
             <a:fld id="{C69E31BE-431C-4F96-86FE-0099C953F73C}" type="datetimeFigureOut">
               <a:rPr lang="en-US" smtClean="0"/>
               <a:pPr/>
-              <a:t>4/2/2015</a:t>
+              <a:t>8/28/2015</a:t>
             </a:fld>
             <a:endParaRPr lang="en-US"/>
           </a:p>
@@ -1829,7 +1829,7 @@
     </p:spTree>
     <p:extLst>
       <p:ext uri="{BB962C8B-B14F-4D97-AF65-F5344CB8AC3E}">
-        <p14:creationId xmlns="" xmlns:p14="http://schemas.microsoft.com/office/powerpoint/2010/main" val="202499912"/>
+        <p14:creationId xmlns:p14="http://schemas.microsoft.com/office/powerpoint/2010/main" xmlns="" val="202499912"/>
       </p:ext>
     </p:extLst>
   </p:cSld>
@@ -1897,7 +1897,7 @@
             <a:fld id="{C69E31BE-431C-4F96-86FE-0099C953F73C}" type="datetimeFigureOut">
               <a:rPr lang="en-US" smtClean="0"/>
               <a:pPr/>
-              <a:t>4/2/2015</a:t>
+              <a:t>8/28/2015</a:t>
             </a:fld>
             <a:endParaRPr lang="en-US"/>
           </a:p>
@@ -1949,7 +1949,7 @@
     </p:spTree>
     <p:extLst>
       <p:ext uri="{BB962C8B-B14F-4D97-AF65-F5344CB8AC3E}">
-        <p14:creationId xmlns="" xmlns:p14="http://schemas.microsoft.com/office/powerpoint/2010/main" val="1124304537"/>
+        <p14:creationId xmlns:p14="http://schemas.microsoft.com/office/powerpoint/2010/main" xmlns="" val="1124304537"/>
       </p:ext>
     </p:extLst>
   </p:cSld>
@@ -1994,7 +1994,7 @@
             <a:fld id="{C69E31BE-431C-4F96-86FE-0099C953F73C}" type="datetimeFigureOut">
               <a:rPr lang="en-US" smtClean="0"/>
               <a:pPr/>
-              <a:t>4/2/2015</a:t>
+              <a:t>8/28/2015</a:t>
             </a:fld>
             <a:endParaRPr lang="en-US"/>
           </a:p>
@@ -2046,7 +2046,7 @@
     </p:spTree>
     <p:extLst>
       <p:ext uri="{BB962C8B-B14F-4D97-AF65-F5344CB8AC3E}">
-        <p14:creationId xmlns="" xmlns:p14="http://schemas.microsoft.com/office/powerpoint/2010/main" val="4086690259"/>
+        <p14:creationId xmlns:p14="http://schemas.microsoft.com/office/powerpoint/2010/main" xmlns="" val="4086690259"/>
       </p:ext>
     </p:extLst>
   </p:cSld>
@@ -2273,7 +2273,7 @@
             <a:fld id="{C69E31BE-431C-4F96-86FE-0099C953F73C}" type="datetimeFigureOut">
               <a:rPr lang="en-US" smtClean="0"/>
               <a:pPr/>
-              <a:t>4/2/2015</a:t>
+              <a:t>8/28/2015</a:t>
             </a:fld>
             <a:endParaRPr lang="en-US"/>
           </a:p>
@@ -2325,7 +2325,7 @@
     </p:spTree>
     <p:extLst>
       <p:ext uri="{BB962C8B-B14F-4D97-AF65-F5344CB8AC3E}">
-        <p14:creationId xmlns="" xmlns:p14="http://schemas.microsoft.com/office/powerpoint/2010/main" val="161573557"/>
+        <p14:creationId xmlns:p14="http://schemas.microsoft.com/office/powerpoint/2010/main" xmlns="" val="161573557"/>
       </p:ext>
     </p:extLst>
   </p:cSld>
@@ -2528,7 +2528,7 @@
             <a:fld id="{C69E31BE-431C-4F96-86FE-0099C953F73C}" type="datetimeFigureOut">
               <a:rPr lang="en-US" smtClean="0"/>
               <a:pPr/>
-              <a:t>4/2/2015</a:t>
+              <a:t>8/28/2015</a:t>
             </a:fld>
             <a:endParaRPr lang="en-US"/>
           </a:p>
@@ -2580,7 +2580,7 @@
     </p:spTree>
     <p:extLst>
       <p:ext uri="{BB962C8B-B14F-4D97-AF65-F5344CB8AC3E}">
-        <p14:creationId xmlns="" xmlns:p14="http://schemas.microsoft.com/office/powerpoint/2010/main" val="1090656924"/>
+        <p14:creationId xmlns:p14="http://schemas.microsoft.com/office/powerpoint/2010/main" xmlns="" val="1090656924"/>
       </p:ext>
     </p:extLst>
   </p:cSld>
@@ -2743,7 +2743,7 @@
             <a:fld id="{C69E31BE-431C-4F96-86FE-0099C953F73C}" type="datetimeFigureOut">
               <a:rPr lang="en-US" smtClean="0"/>
               <a:pPr/>
-              <a:t>4/2/2015</a:t>
+              <a:t>8/28/2015</a:t>
             </a:fld>
             <a:endParaRPr lang="en-US"/>
           </a:p>
@@ -2831,7 +2831,7 @@
     </p:spTree>
     <p:extLst>
       <p:ext uri="{BB962C8B-B14F-4D97-AF65-F5344CB8AC3E}">
-        <p14:creationId xmlns="" xmlns:p14="http://schemas.microsoft.com/office/powerpoint/2010/main" val="2194502168"/>
+        <p14:creationId xmlns:p14="http://schemas.microsoft.com/office/powerpoint/2010/main" xmlns="" val="2194502168"/>
       </p:ext>
     </p:extLst>
   </p:cSld>
@@ -3445,8 +3445,8 @@
         </p:nvSpPr>
         <p:spPr>
           <a:xfrm>
-            <a:off x="1015155" y="5243671"/>
-            <a:ext cx="1334335" cy="597094"/>
+            <a:off x="1015155" y="5158581"/>
+            <a:ext cx="1334335" cy="676910"/>
           </a:xfrm>
           <a:prstGeom prst="roundRect">
             <a:avLst/>
@@ -3483,8 +3483,19 @@
                 <a:ea typeface="ＭＳ Ｐゴシック" pitchFamily="34" charset="-128"/>
                 <a:cs typeface="Calibri" pitchFamily="34" charset="0"/>
               </a:rPr>
-              <a:t>6. EHR system allows for Provider data-entry into the form/template</a:t>
-            </a:r>
+              <a:t>6. EHR system allows for </a:t>
+            </a:r>
+            <a:r>
+              <a:rPr lang="en-US" sz="900" b="1" dirty="0" smtClean="0">
+                <a:ea typeface="ＭＳ Ｐゴシック" pitchFamily="34" charset="-128"/>
+                <a:cs typeface="Calibri" pitchFamily="34" charset="0"/>
+              </a:rPr>
+              <a:t>data-entry and correction of Questionnaire Response</a:t>
+            </a:r>
+            <a:endParaRPr lang="en-US" sz="900" b="1" dirty="0">
+              <a:ea typeface="ＭＳ Ｐゴシック" pitchFamily="34" charset="-128"/>
+              <a:cs typeface="Calibri" pitchFamily="34" charset="0"/>
+            </a:endParaRPr>
           </a:p>
         </p:txBody>
       </p:sp>
@@ -3585,8 +3596,19 @@
                 <a:ea typeface="ＭＳ Ｐゴシック" pitchFamily="34" charset="-128"/>
                 <a:cs typeface="Calibri" pitchFamily="34" charset="0"/>
               </a:rPr>
-              <a:t>7. The EHR system transmits completed structured data in standard format</a:t>
-            </a:r>
+              <a:t>7. The EHR system transmits completed </a:t>
+            </a:r>
+            <a:r>
+              <a:rPr lang="en-US" sz="900" b="1" dirty="0" smtClean="0">
+                <a:ea typeface="ＭＳ Ｐゴシック" pitchFamily="34" charset="-128"/>
+                <a:cs typeface="Calibri" pitchFamily="34" charset="0"/>
+              </a:rPr>
+              <a:t>Questionnaire Response</a:t>
+            </a:r>
+            <a:endParaRPr lang="en-US" sz="900" b="1" dirty="0">
+              <a:ea typeface="ＭＳ Ｐゴシック" pitchFamily="34" charset="-128"/>
+              <a:cs typeface="Calibri" pitchFamily="34" charset="0"/>
+            </a:endParaRPr>
           </a:p>
         </p:txBody>
       </p:sp>
@@ -3636,8 +3658,19 @@
                 <a:ea typeface="ＭＳ Ｐゴシック" pitchFamily="34" charset="-128"/>
                 <a:cs typeface="Calibri" pitchFamily="34" charset="0"/>
               </a:rPr>
-              <a:t>8. The External Data Repository receives the structured data</a:t>
-            </a:r>
+              <a:t>8. The External Data Repository receives the </a:t>
+            </a:r>
+            <a:r>
+              <a:rPr lang="en-US" sz="900" b="1" dirty="0" smtClean="0">
+                <a:ea typeface="ＭＳ Ｐゴシック" pitchFamily="34" charset="-128"/>
+                <a:cs typeface="Calibri" pitchFamily="34" charset="0"/>
+              </a:rPr>
+              <a:t>Questionnaire Response</a:t>
+            </a:r>
+            <a:endParaRPr lang="en-US" sz="900" b="1" dirty="0">
+              <a:ea typeface="ＭＳ Ｐゴシック" pitchFamily="34" charset="-128"/>
+              <a:cs typeface="Calibri" pitchFamily="34" charset="0"/>
+            </a:endParaRPr>
           </a:p>
         </p:txBody>
       </p:sp>
@@ -3688,8 +3721,19 @@
                 <a:ea typeface="ＭＳ Ｐゴシック" pitchFamily="34" charset="-128"/>
                 <a:cs typeface="Calibri" pitchFamily="34" charset="0"/>
               </a:rPr>
-              <a:t>1. EHR system sends request for form/template</a:t>
-            </a:r>
+              <a:t>1. EHR system sends request for </a:t>
+            </a:r>
+            <a:r>
+              <a:rPr lang="en-US" sz="900" b="1" dirty="0" smtClean="0">
+                <a:ea typeface="ＭＳ Ｐゴシック" pitchFamily="34" charset="-128"/>
+                <a:cs typeface="Calibri" pitchFamily="34" charset="0"/>
+              </a:rPr>
+              <a:t>populated Questionnaire Response</a:t>
+            </a:r>
+            <a:endParaRPr lang="en-US" sz="900" b="1" dirty="0" smtClean="0">
+              <a:ea typeface="ＭＳ Ｐゴシック" pitchFamily="34" charset="-128"/>
+              <a:cs typeface="Calibri" pitchFamily="34" charset="0"/>
+            </a:endParaRPr>
           </a:p>
           <a:p>
             <a:pPr algn="ctr" defTabSz="446367" fontAlgn="base">
@@ -3781,8 +3825,19 @@
                 <a:ea typeface="ＭＳ Ｐゴシック" pitchFamily="34" charset="-128"/>
                 <a:cs typeface="Calibri" pitchFamily="34" charset="0"/>
               </a:rPr>
-              <a:t>5. EHR system displays correct form/template</a:t>
-            </a:r>
+              <a:t>5. EHR system displays </a:t>
+            </a:r>
+            <a:r>
+              <a:rPr lang="en-US" sz="900" b="1" dirty="0" smtClean="0">
+                <a:ea typeface="ＭＳ Ｐゴシック" pitchFamily="34" charset="-128"/>
+                <a:cs typeface="Calibri" pitchFamily="34" charset="0"/>
+              </a:rPr>
+              <a:t>partially completed Questionnaire Response</a:t>
+            </a:r>
+            <a:endParaRPr lang="en-US" sz="900" b="1" dirty="0">
+              <a:ea typeface="ＭＳ Ｐゴシック" pitchFamily="34" charset="-128"/>
+              <a:cs typeface="Calibri" pitchFamily="34" charset="0"/>
+            </a:endParaRPr>
           </a:p>
         </p:txBody>
       </p:sp>
@@ -3832,8 +3887,19 @@
                 <a:ea typeface="ＭＳ Ｐゴシック" pitchFamily="34" charset="-128"/>
                 <a:cs typeface="Calibri" pitchFamily="34" charset="0"/>
               </a:rPr>
-              <a:t>3. Form/Template repository sends correct form/template</a:t>
-            </a:r>
+              <a:t>3. Form/Template repository sends </a:t>
+            </a:r>
+            <a:r>
+              <a:rPr lang="en-US" sz="900" b="1" dirty="0" smtClean="0">
+                <a:ea typeface="ＭＳ Ｐゴシック" pitchFamily="34" charset="-128"/>
+                <a:cs typeface="Calibri" pitchFamily="34" charset="0"/>
+              </a:rPr>
+              <a:t>partially populated Questionnaire Response</a:t>
+            </a:r>
+            <a:endParaRPr lang="en-US" sz="900" b="1" dirty="0">
+              <a:ea typeface="ＭＳ Ｐゴシック" pitchFamily="34" charset="-128"/>
+              <a:cs typeface="Calibri" pitchFamily="34" charset="0"/>
+            </a:endParaRPr>
           </a:p>
         </p:txBody>
       </p:sp>
@@ -3920,7 +3986,7 @@
                 <a:ea typeface="ＭＳ Ｐゴシック" pitchFamily="34" charset="-128"/>
                 <a:cs typeface="Calibri" pitchFamily="34" charset="0"/>
               </a:rPr>
-              <a:t>Form </a:t>
+              <a:t>Questionnaire Response </a:t>
             </a:r>
             <a:r>
               <a:rPr lang="en-US" sz="900" b="1" dirty="0">
@@ -3941,7 +4007,14 @@
                 <a:ea typeface="ＭＳ Ｐゴシック" pitchFamily="34" charset="-128"/>
                 <a:cs typeface="Calibri" pitchFamily="34" charset="0"/>
               </a:rPr>
-              <a:t>with some EHR-derived </a:t>
+              <a:t>with </a:t>
+            </a:r>
+            <a:r>
+              <a:rPr lang="en-US" sz="900" b="1" dirty="0" smtClean="0">
+                <a:ea typeface="ＭＳ Ｐゴシック" pitchFamily="34" charset="-128"/>
+                <a:cs typeface="Calibri" pitchFamily="34" charset="0"/>
+              </a:rPr>
+              <a:t>EHR-derived </a:t>
             </a:r>
             <a:r>
               <a:rPr lang="en-US" sz="900" b="1" dirty="0" smtClean="0">
@@ -4004,7 +4077,28 @@
                 <a:ea typeface="ＭＳ Ｐゴシック" pitchFamily="34" charset="-128"/>
                 <a:cs typeface="Calibri" pitchFamily="34" charset="0"/>
               </a:rPr>
-              <a:t>2. Form/Template repository receives request for form/template</a:t>
+              <a:t>2. </a:t>
+            </a:r>
+            <a:r>
+              <a:rPr lang="en-US" sz="900" b="1" dirty="0" smtClean="0">
+                <a:ea typeface="ＭＳ Ｐゴシック" pitchFamily="34" charset="-128"/>
+                <a:cs typeface="Calibri" pitchFamily="34" charset="0"/>
+              </a:rPr>
+              <a:t>Form repository </a:t>
+            </a:r>
+            <a:r>
+              <a:rPr lang="en-US" sz="900" b="1" dirty="0" smtClean="0">
+                <a:ea typeface="ＭＳ Ｐゴシック" pitchFamily="34" charset="-128"/>
+                <a:cs typeface="Calibri" pitchFamily="34" charset="0"/>
+              </a:rPr>
+              <a:t>receives request for </a:t>
+            </a:r>
+            <a:r>
+              <a:rPr lang="en-US" sz="900" b="1" dirty="0" smtClean="0">
+                <a:ea typeface="ＭＳ Ｐゴシック" pitchFamily="34" charset="-128"/>
+                <a:cs typeface="Calibri" pitchFamily="34" charset="0"/>
+              </a:rPr>
+              <a:t>populated Questionnaire Response</a:t>
             </a:r>
             <a:endParaRPr lang="en-US" sz="900" b="1" dirty="0">
               <a:ea typeface="ＭＳ Ｐゴシック" pitchFamily="34" charset="-128"/>
@@ -4059,7 +4153,21 @@
                 <a:ea typeface="ＭＳ Ｐゴシック" pitchFamily="34" charset="-128"/>
                 <a:cs typeface="Calibri" pitchFamily="34" charset="0"/>
               </a:rPr>
-              <a:t>9. The External Data Repository stores the structured data in standard format</a:t>
+              <a:t>9. The External Data Repository stores the </a:t>
+            </a:r>
+            <a:r>
+              <a:rPr lang="en-US" sz="900" b="1" dirty="0" smtClean="0">
+                <a:ea typeface="ＭＳ Ｐゴシック" pitchFamily="34" charset="-128"/>
+                <a:cs typeface="Calibri" pitchFamily="34" charset="0"/>
+              </a:rPr>
+              <a:t>Questionnaire Response </a:t>
+            </a:r>
+            <a:r>
+              <a:rPr lang="en-US" sz="900" b="1" dirty="0">
+                <a:ea typeface="ＭＳ Ｐゴシック" pitchFamily="34" charset="-128"/>
+                <a:cs typeface="Calibri" pitchFamily="34" charset="0"/>
+              </a:rPr>
+              <a:t>in standard format</a:t>
             </a:r>
           </a:p>
         </p:txBody>
@@ -4218,8 +4326,8 @@
         </p:nvCxnSpPr>
         <p:spPr>
           <a:xfrm>
-            <a:off x="1682321" y="5094398"/>
-            <a:ext cx="0" cy="149273"/>
+            <a:off x="1682323" y="5094398"/>
+            <a:ext cx="0" cy="64183"/>
           </a:xfrm>
           <a:prstGeom prst="straightConnector1">
             <a:avLst/>
@@ -4254,8 +4362,8 @@
         </p:nvCxnSpPr>
         <p:spPr>
           <a:xfrm>
-            <a:off x="1682321" y="5840767"/>
-            <a:ext cx="0" cy="149273"/>
+            <a:off x="1682323" y="5835491"/>
+            <a:ext cx="0" cy="154550"/>
           </a:xfrm>
           <a:prstGeom prst="straightConnector1">
             <a:avLst/>
@@ -4433,8 +4541,19 @@
                 <a:ea typeface="ＭＳ Ｐゴシック" pitchFamily="34" charset="-128"/>
                 <a:cs typeface="Calibri" pitchFamily="34" charset="0"/>
               </a:rPr>
-              <a:t>4. EHR System receives correct form/template</a:t>
-            </a:r>
+              <a:t>4. EHR System receives correct </a:t>
+            </a:r>
+            <a:r>
+              <a:rPr lang="en-US" sz="900" b="1" dirty="0" smtClean="0">
+                <a:ea typeface="ＭＳ Ｐゴシック" pitchFamily="34" charset="-128"/>
+                <a:cs typeface="Calibri" pitchFamily="34" charset="0"/>
+              </a:rPr>
+              <a:t>Questionnaire Response</a:t>
+            </a:r>
+            <a:endParaRPr lang="en-US" sz="900" b="1" dirty="0">
+              <a:ea typeface="ＭＳ Ｐゴシック" pitchFamily="34" charset="-128"/>
+              <a:cs typeface="Calibri" pitchFamily="34" charset="0"/>
+            </a:endParaRPr>
           </a:p>
         </p:txBody>
       </p:sp>
@@ -4557,7 +4676,7 @@
                 <a:ea typeface="ＭＳ Ｐゴシック" pitchFamily="34" charset="-128"/>
                 <a:cs typeface="Calibri" pitchFamily="34" charset="0"/>
               </a:rPr>
-              <a:t>Form </a:t>
+              <a:t>Questionnaire Response </a:t>
             </a:r>
             <a:r>
               <a:rPr lang="en-US" sz="900" b="1" dirty="0">
@@ -4578,14 +4697,21 @@
                 <a:ea typeface="ＭＳ Ｐゴシック" pitchFamily="34" charset="-128"/>
                 <a:cs typeface="Calibri" pitchFamily="34" charset="0"/>
               </a:rPr>
-              <a:t>with some </a:t>
+              <a:t>with </a:t>
             </a:r>
             <a:r>
               <a:rPr lang="en-US" sz="900" b="1" dirty="0" smtClean="0">
                 <a:ea typeface="ＭＳ Ｐゴシック" pitchFamily="34" charset="-128"/>
                 <a:cs typeface="Calibri" pitchFamily="34" charset="0"/>
               </a:rPr>
-              <a:t>EHR-provided patient data</a:t>
+              <a:t>EHR-provided </a:t>
+            </a:r>
+            <a:r>
+              <a:rPr lang="en-US" sz="900" b="1" dirty="0" smtClean="0">
+                <a:ea typeface="ＭＳ Ｐゴシック" pitchFamily="34" charset="-128"/>
+                <a:cs typeface="Calibri" pitchFamily="34" charset="0"/>
+              </a:rPr>
+              <a:t>patient data</a:t>
             </a:r>
             <a:endParaRPr lang="en-US" sz="900" b="1" dirty="0">
               <a:ea typeface="ＭＳ Ｐゴシック" pitchFamily="34" charset="-128"/>
@@ -4822,7 +4948,7 @@
     </p:spTree>
     <p:extLst>
       <p:ext uri="{BB962C8B-B14F-4D97-AF65-F5344CB8AC3E}">
-        <p14:creationId xmlns="" xmlns:p14="http://schemas.microsoft.com/office/powerpoint/2010/main" val="779856399"/>
+        <p14:creationId xmlns:p14="http://schemas.microsoft.com/office/powerpoint/2010/main" xmlns="" val="779856399"/>
       </p:ext>
     </p:extLst>
   </p:cSld>
@@ -5118,9 +5244,12 @@
 </file>
 
 <file path=customXml/item1.xml><?xml version="1.0" encoding="utf-8"?>
-<p:properties xmlns:p="http://schemas.microsoft.com/office/2006/metadata/properties" xmlns:xsi="http://www.w3.org/2001/XMLSchema-instance">
-  <documentManagement/>
-</p:properties>
+<?mso-contentType ?>
+<FormTemplates xmlns="http://schemas.microsoft.com/sharepoint/v3/contenttype/forms">
+  <Display>DocumentLibraryForm</Display>
+  <Edit>DocumentLibraryForm</Edit>
+  <New>DocumentLibraryForm</New>
+</FormTemplates>
 </file>
 
 <file path=customXml/item2.xml><?xml version="1.0" encoding="utf-8"?>
@@ -5173,24 +5302,15 @@
 </file>
 
 <file path=customXml/item3.xml><?xml version="1.0" encoding="utf-8"?>
-<?mso-contentType ?>
-<FormTemplates xmlns="http://schemas.microsoft.com/sharepoint/v3/contenttype/forms">
-  <Display>DocumentLibraryForm</Display>
-  <Edit>DocumentLibraryForm</Edit>
-  <New>DocumentLibraryForm</New>
-</FormTemplates>
+<p:properties xmlns:p="http://schemas.microsoft.com/office/2006/metadata/properties" xmlns:xsi="http://www.w3.org/2001/XMLSchema-instance">
+  <documentManagement/>
+</p:properties>
 </file>
 
 <file path=customXml/itemProps1.xml><?xml version="1.0" encoding="utf-8"?>
-<ds:datastoreItem xmlns:ds="http://schemas.openxmlformats.org/officeDocument/2006/customXml" ds:itemID="{AA05AFCB-176E-411D-8F54-3F7328DC8DF9}">
+<ds:datastoreItem xmlns:ds="http://schemas.openxmlformats.org/officeDocument/2006/customXml" ds:itemID="{93867DCD-913B-4BE7-B218-6A941DDB47CC}">
   <ds:schemaRefs>
-    <ds:schemaRef ds:uri="http://schemas.microsoft.com/office/2006/documentManagement/types"/>
-    <ds:schemaRef ds:uri="http://purl.org/dc/terms/"/>
-    <ds:schemaRef ds:uri="http://schemas.microsoft.com/office/2006/metadata/properties"/>
-    <ds:schemaRef ds:uri="http://purl.org/dc/dcmitype/"/>
-    <ds:schemaRef ds:uri="http://www.w3.org/XML/1998/namespace"/>
-    <ds:schemaRef ds:uri="http://schemas.openxmlformats.org/package/2006/metadata/core-properties"/>
-    <ds:schemaRef ds:uri="http://purl.org/dc/elements/1.1/"/>
+    <ds:schemaRef ds:uri="http://schemas.microsoft.com/sharepoint/v3/contenttype/forms"/>
   </ds:schemaRefs>
 </ds:datastoreItem>
 </file>
@@ -5211,9 +5331,15 @@
 </file>
 
 <file path=customXml/itemProps3.xml><?xml version="1.0" encoding="utf-8"?>
-<ds:datastoreItem xmlns:ds="http://schemas.openxmlformats.org/officeDocument/2006/customXml" ds:itemID="{93867DCD-913B-4BE7-B218-6A941DDB47CC}">
+<ds:datastoreItem xmlns:ds="http://schemas.openxmlformats.org/officeDocument/2006/customXml" ds:itemID="{AA05AFCB-176E-411D-8F54-3F7328DC8DF9}">
   <ds:schemaRefs>
-    <ds:schemaRef ds:uri="http://schemas.microsoft.com/sharepoint/v3/contenttype/forms"/>
+    <ds:schemaRef ds:uri="http://schemas.microsoft.com/office/2006/documentManagement/types"/>
+    <ds:schemaRef ds:uri="http://purl.org/dc/terms/"/>
+    <ds:schemaRef ds:uri="http://schemas.microsoft.com/office/2006/metadata/properties"/>
+    <ds:schemaRef ds:uri="http://purl.org/dc/dcmitype/"/>
+    <ds:schemaRef ds:uri="http://www.w3.org/XML/1998/namespace"/>
+    <ds:schemaRef ds:uri="http://schemas.openxmlformats.org/package/2006/metadata/core-properties"/>
+    <ds:schemaRef ds:uri="http://purl.org/dc/elements/1.1/"/>
   </ds:schemaRefs>
 </ds:datastoreItem>
 </file>
</xml_diff>

<commit_message>
Corrected conformance resources and updated SDC IG as per [#6806], [#6900] and [#6892]
git-svn-id: http://gforge.hl7.org/svn/fhir/trunk/build@7042 2f0db536-2c49-4257-a3fa-e771ed206c19
</commit_message>
<xml_diff>
--- a/guides/sdc/sdc-generic-workflow.pptx
+++ b/guides/sdc/sdc-generic-workflow.pptx
@@ -7,7 +7,7 @@
   <p:sldIdLst>
     <p:sldId id="256" r:id="rId5"/>
   </p:sldIdLst>
-  <p:sldSz cx="6480175" cy="8640763"/>
+  <p:sldSz cx="7921625" cy="8640763"/>
   <p:notesSz cx="6858000" cy="9144000"/>
   <p:defaultTextStyle>
     <a:defPPr>
@@ -136,8 +136,8 @@
         </p:nvSpPr>
         <p:spPr>
           <a:xfrm>
-            <a:off x="486016" y="2684244"/>
-            <a:ext cx="5508150" cy="1852162"/>
+            <a:off x="594125" y="2684246"/>
+            <a:ext cx="6733383" cy="1852162"/>
           </a:xfrm>
         </p:spPr>
         <p:txBody>
@@ -164,8 +164,8 @@
         </p:nvSpPr>
         <p:spPr>
           <a:xfrm>
-            <a:off x="972028" y="4896436"/>
-            <a:ext cx="4536123" cy="2208197"/>
+            <a:off x="1188250" y="4896438"/>
+            <a:ext cx="5545138" cy="2208196"/>
           </a:xfrm>
         </p:spPr>
         <p:txBody>
@@ -289,7 +289,7 @@
             <a:fld id="{C69E31BE-431C-4F96-86FE-0099C953F73C}" type="datetimeFigureOut">
               <a:rPr lang="en-US" smtClean="0"/>
               <a:pPr/>
-              <a:t>8/28/2015</a:t>
+              <a:t>9/16/2015</a:t>
             </a:fld>
             <a:endParaRPr lang="en-US"/>
           </a:p>
@@ -341,7 +341,7 @@
     </p:spTree>
     <p:extLst>
       <p:ext uri="{BB962C8B-B14F-4D97-AF65-F5344CB8AC3E}">
-        <p14:creationId xmlns:p14="http://schemas.microsoft.com/office/powerpoint/2010/main" xmlns="" val="2187467626"/>
+        <p14:creationId xmlns="" xmlns:p14="http://schemas.microsoft.com/office/powerpoint/2010/main" val="2187467626"/>
       </p:ext>
     </p:extLst>
   </p:cSld>
@@ -461,7 +461,7 @@
             <a:fld id="{C69E31BE-431C-4F96-86FE-0099C953F73C}" type="datetimeFigureOut">
               <a:rPr lang="en-US" smtClean="0"/>
               <a:pPr/>
-              <a:t>8/28/2015</a:t>
+              <a:t>9/16/2015</a:t>
             </a:fld>
             <a:endParaRPr lang="en-US"/>
           </a:p>
@@ -513,7 +513,7 @@
     </p:spTree>
     <p:extLst>
       <p:ext uri="{BB962C8B-B14F-4D97-AF65-F5344CB8AC3E}">
-        <p14:creationId xmlns:p14="http://schemas.microsoft.com/office/powerpoint/2010/main" xmlns="" val="790259655"/>
+        <p14:creationId xmlns="" xmlns:p14="http://schemas.microsoft.com/office/powerpoint/2010/main" val="790259655"/>
       </p:ext>
     </p:extLst>
   </p:cSld>
@@ -552,8 +552,8 @@
         </p:nvSpPr>
         <p:spPr>
           <a:xfrm>
-            <a:off x="3523603" y="646061"/>
-            <a:ext cx="1093532" cy="13761217"/>
+            <a:off x="4307393" y="646062"/>
+            <a:ext cx="1336777" cy="13761217"/>
           </a:xfrm>
         </p:spPr>
         <p:txBody>
@@ -580,8 +580,8 @@
         </p:nvSpPr>
         <p:spPr>
           <a:xfrm>
-            <a:off x="243016" y="646061"/>
-            <a:ext cx="3172586" cy="13761217"/>
+            <a:off x="297072" y="646062"/>
+            <a:ext cx="3878296" cy="13761217"/>
           </a:xfrm>
         </p:spPr>
         <p:txBody>
@@ -643,7 +643,7 @@
             <a:fld id="{C69E31BE-431C-4F96-86FE-0099C953F73C}" type="datetimeFigureOut">
               <a:rPr lang="en-US" smtClean="0"/>
               <a:pPr/>
-              <a:t>8/28/2015</a:t>
+              <a:t>9/16/2015</a:t>
             </a:fld>
             <a:endParaRPr lang="en-US"/>
           </a:p>
@@ -695,7 +695,7 @@
     </p:spTree>
     <p:extLst>
       <p:ext uri="{BB962C8B-B14F-4D97-AF65-F5344CB8AC3E}">
-        <p14:creationId xmlns:p14="http://schemas.microsoft.com/office/powerpoint/2010/main" xmlns="" val="502563980"/>
+        <p14:creationId xmlns="" xmlns:p14="http://schemas.microsoft.com/office/powerpoint/2010/main" val="502563980"/>
       </p:ext>
     </p:extLst>
   </p:cSld>
@@ -815,7 +815,7 @@
             <a:fld id="{C69E31BE-431C-4F96-86FE-0099C953F73C}" type="datetimeFigureOut">
               <a:rPr lang="en-US" smtClean="0"/>
               <a:pPr/>
-              <a:t>8/28/2015</a:t>
+              <a:t>9/16/2015</a:t>
             </a:fld>
             <a:endParaRPr lang="en-US"/>
           </a:p>
@@ -867,7 +867,7 @@
     </p:spTree>
     <p:extLst>
       <p:ext uri="{BB962C8B-B14F-4D97-AF65-F5344CB8AC3E}">
-        <p14:creationId xmlns:p14="http://schemas.microsoft.com/office/powerpoint/2010/main" xmlns="" val="4133789058"/>
+        <p14:creationId xmlns="" xmlns:p14="http://schemas.microsoft.com/office/powerpoint/2010/main" val="4133789058"/>
       </p:ext>
     </p:extLst>
   </p:cSld>
@@ -906,8 +906,8 @@
         </p:nvSpPr>
         <p:spPr>
           <a:xfrm>
-            <a:off x="511892" y="5552493"/>
-            <a:ext cx="5508150" cy="1716151"/>
+            <a:off x="625757" y="5552499"/>
+            <a:ext cx="6733383" cy="1716151"/>
           </a:xfrm>
         </p:spPr>
         <p:txBody>
@@ -938,8 +938,8 @@
         </p:nvSpPr>
         <p:spPr>
           <a:xfrm>
-            <a:off x="511892" y="3662332"/>
-            <a:ext cx="5508150" cy="1890165"/>
+            <a:off x="625757" y="3662337"/>
+            <a:ext cx="6733383" cy="1890165"/>
           </a:xfrm>
         </p:spPr>
         <p:txBody>
@@ -1063,7 +1063,7 @@
             <a:fld id="{C69E31BE-431C-4F96-86FE-0099C953F73C}" type="datetimeFigureOut">
               <a:rPr lang="en-US" smtClean="0"/>
               <a:pPr/>
-              <a:t>8/28/2015</a:t>
+              <a:t>9/16/2015</a:t>
             </a:fld>
             <a:endParaRPr lang="en-US"/>
           </a:p>
@@ -1115,7 +1115,7 @@
     </p:spTree>
     <p:extLst>
       <p:ext uri="{BB962C8B-B14F-4D97-AF65-F5344CB8AC3E}">
-        <p14:creationId xmlns:p14="http://schemas.microsoft.com/office/powerpoint/2010/main" xmlns="" val="458461516"/>
+        <p14:creationId xmlns="" xmlns:p14="http://schemas.microsoft.com/office/powerpoint/2010/main" val="458461516"/>
       </p:ext>
     </p:extLst>
   </p:cSld>
@@ -1177,8 +1177,8 @@
         </p:nvSpPr>
         <p:spPr>
           <a:xfrm>
-            <a:off x="324012" y="2016180"/>
-            <a:ext cx="2862078" cy="5702504"/>
+            <a:off x="396085" y="2016184"/>
+            <a:ext cx="3498719" cy="5702505"/>
           </a:xfrm>
         </p:spPr>
         <p:txBody>
@@ -1262,8 +1262,8 @@
         </p:nvSpPr>
         <p:spPr>
           <a:xfrm>
-            <a:off x="3294089" y="2016180"/>
-            <a:ext cx="2862078" cy="5702504"/>
+            <a:off x="4026826" y="2016184"/>
+            <a:ext cx="3498719" cy="5702505"/>
           </a:xfrm>
         </p:spPr>
         <p:txBody>
@@ -1353,7 +1353,7 @@
             <a:fld id="{C69E31BE-431C-4F96-86FE-0099C953F73C}" type="datetimeFigureOut">
               <a:rPr lang="en-US" smtClean="0"/>
               <a:pPr/>
-              <a:t>8/28/2015</a:t>
+              <a:t>9/16/2015</a:t>
             </a:fld>
             <a:endParaRPr lang="en-US"/>
           </a:p>
@@ -1405,7 +1405,7 @@
     </p:spTree>
     <p:extLst>
       <p:ext uri="{BB962C8B-B14F-4D97-AF65-F5344CB8AC3E}">
-        <p14:creationId xmlns:p14="http://schemas.microsoft.com/office/powerpoint/2010/main" xmlns="" val="797418400"/>
+        <p14:creationId xmlns="" xmlns:p14="http://schemas.microsoft.com/office/powerpoint/2010/main" val="797418400"/>
       </p:ext>
     </p:extLst>
   </p:cSld>
@@ -1471,8 +1471,8 @@
         </p:nvSpPr>
         <p:spPr>
           <a:xfrm>
-            <a:off x="324015" y="1934171"/>
-            <a:ext cx="2863202" cy="806072"/>
+            <a:off x="396089" y="1934171"/>
+            <a:ext cx="3500093" cy="806072"/>
           </a:xfrm>
         </p:spPr>
         <p:txBody>
@@ -1536,8 +1536,8 @@
         </p:nvSpPr>
         <p:spPr>
           <a:xfrm>
-            <a:off x="324015" y="2740243"/>
-            <a:ext cx="2863202" cy="4978441"/>
+            <a:off x="396089" y="2740243"/>
+            <a:ext cx="3500093" cy="4978442"/>
           </a:xfrm>
         </p:spPr>
         <p:txBody>
@@ -1621,8 +1621,8 @@
         </p:nvSpPr>
         <p:spPr>
           <a:xfrm>
-            <a:off x="3291846" y="1934171"/>
-            <a:ext cx="2864328" cy="806072"/>
+            <a:off x="4024084" y="1934171"/>
+            <a:ext cx="3501469" cy="806072"/>
           </a:xfrm>
         </p:spPr>
         <p:txBody>
@@ -1686,8 +1686,8 @@
         </p:nvSpPr>
         <p:spPr>
           <a:xfrm>
-            <a:off x="3291846" y="2740243"/>
-            <a:ext cx="2864328" cy="4978441"/>
+            <a:off x="4024084" y="2740243"/>
+            <a:ext cx="3501469" cy="4978442"/>
           </a:xfrm>
         </p:spPr>
         <p:txBody>
@@ -1777,7 +1777,7 @@
             <a:fld id="{C69E31BE-431C-4F96-86FE-0099C953F73C}" type="datetimeFigureOut">
               <a:rPr lang="en-US" smtClean="0"/>
               <a:pPr/>
-              <a:t>8/28/2015</a:t>
+              <a:t>9/16/2015</a:t>
             </a:fld>
             <a:endParaRPr lang="en-US"/>
           </a:p>
@@ -1829,7 +1829,7 @@
     </p:spTree>
     <p:extLst>
       <p:ext uri="{BB962C8B-B14F-4D97-AF65-F5344CB8AC3E}">
-        <p14:creationId xmlns:p14="http://schemas.microsoft.com/office/powerpoint/2010/main" xmlns="" val="202499912"/>
+        <p14:creationId xmlns="" xmlns:p14="http://schemas.microsoft.com/office/powerpoint/2010/main" val="202499912"/>
       </p:ext>
     </p:extLst>
   </p:cSld>
@@ -1897,7 +1897,7 @@
             <a:fld id="{C69E31BE-431C-4F96-86FE-0099C953F73C}" type="datetimeFigureOut">
               <a:rPr lang="en-US" smtClean="0"/>
               <a:pPr/>
-              <a:t>8/28/2015</a:t>
+              <a:t>9/16/2015</a:t>
             </a:fld>
             <a:endParaRPr lang="en-US"/>
           </a:p>
@@ -1949,7 +1949,7 @@
     </p:spTree>
     <p:extLst>
       <p:ext uri="{BB962C8B-B14F-4D97-AF65-F5344CB8AC3E}">
-        <p14:creationId xmlns:p14="http://schemas.microsoft.com/office/powerpoint/2010/main" xmlns="" val="1124304537"/>
+        <p14:creationId xmlns="" xmlns:p14="http://schemas.microsoft.com/office/powerpoint/2010/main" val="1124304537"/>
       </p:ext>
     </p:extLst>
   </p:cSld>
@@ -1994,7 +1994,7 @@
             <a:fld id="{C69E31BE-431C-4F96-86FE-0099C953F73C}" type="datetimeFigureOut">
               <a:rPr lang="en-US" smtClean="0"/>
               <a:pPr/>
-              <a:t>8/28/2015</a:t>
+              <a:t>9/16/2015</a:t>
             </a:fld>
             <a:endParaRPr lang="en-US"/>
           </a:p>
@@ -2046,7 +2046,7 @@
     </p:spTree>
     <p:extLst>
       <p:ext uri="{BB962C8B-B14F-4D97-AF65-F5344CB8AC3E}">
-        <p14:creationId xmlns:p14="http://schemas.microsoft.com/office/powerpoint/2010/main" xmlns="" val="4086690259"/>
+        <p14:creationId xmlns="" xmlns:p14="http://schemas.microsoft.com/office/powerpoint/2010/main" val="4086690259"/>
       </p:ext>
     </p:extLst>
   </p:cSld>
@@ -2085,8 +2085,8 @@
         </p:nvSpPr>
         <p:spPr>
           <a:xfrm>
-            <a:off x="324020" y="344032"/>
-            <a:ext cx="2131933" cy="1464130"/>
+            <a:off x="396097" y="344038"/>
+            <a:ext cx="2606161" cy="1464129"/>
           </a:xfrm>
         </p:spPr>
         <p:txBody>
@@ -2117,8 +2117,8 @@
         </p:nvSpPr>
         <p:spPr>
           <a:xfrm>
-            <a:off x="2533579" y="344040"/>
-            <a:ext cx="3622599" cy="7374652"/>
+            <a:off x="3097152" y="344042"/>
+            <a:ext cx="4428410" cy="7374652"/>
           </a:xfrm>
         </p:spPr>
         <p:txBody>
@@ -2202,8 +2202,8 @@
         </p:nvSpPr>
         <p:spPr>
           <a:xfrm>
-            <a:off x="324020" y="1808170"/>
-            <a:ext cx="2131933" cy="5910522"/>
+            <a:off x="396097" y="1808170"/>
+            <a:ext cx="2606161" cy="5910522"/>
           </a:xfrm>
         </p:spPr>
         <p:txBody>
@@ -2273,7 +2273,7 @@
             <a:fld id="{C69E31BE-431C-4F96-86FE-0099C953F73C}" type="datetimeFigureOut">
               <a:rPr lang="en-US" smtClean="0"/>
               <a:pPr/>
-              <a:t>8/28/2015</a:t>
+              <a:t>9/16/2015</a:t>
             </a:fld>
             <a:endParaRPr lang="en-US"/>
           </a:p>
@@ -2325,7 +2325,7 @@
     </p:spTree>
     <p:extLst>
       <p:ext uri="{BB962C8B-B14F-4D97-AF65-F5344CB8AC3E}">
-        <p14:creationId xmlns:p14="http://schemas.microsoft.com/office/powerpoint/2010/main" xmlns="" val="161573557"/>
+        <p14:creationId xmlns="" xmlns:p14="http://schemas.microsoft.com/office/powerpoint/2010/main" val="161573557"/>
       </p:ext>
     </p:extLst>
   </p:cSld>
@@ -2364,8 +2364,8 @@
         </p:nvSpPr>
         <p:spPr>
           <a:xfrm>
-            <a:off x="1270164" y="6048537"/>
-            <a:ext cx="3888105" cy="714065"/>
+            <a:off x="1552702" y="6048541"/>
+            <a:ext cx="4752975" cy="714065"/>
           </a:xfrm>
         </p:spPr>
         <p:txBody>
@@ -2396,8 +2396,8 @@
         </p:nvSpPr>
         <p:spPr>
           <a:xfrm>
-            <a:off x="1270164" y="772069"/>
-            <a:ext cx="3888105" cy="5184458"/>
+            <a:off x="1552702" y="772069"/>
+            <a:ext cx="4752975" cy="5184458"/>
           </a:xfrm>
         </p:spPr>
         <p:txBody>
@@ -2457,8 +2457,8 @@
         </p:nvSpPr>
         <p:spPr>
           <a:xfrm>
-            <a:off x="1270164" y="6762602"/>
-            <a:ext cx="3888105" cy="1014087"/>
+            <a:off x="1552702" y="6762603"/>
+            <a:ext cx="4752975" cy="1014088"/>
           </a:xfrm>
         </p:spPr>
         <p:txBody>
@@ -2528,7 +2528,7 @@
             <a:fld id="{C69E31BE-431C-4F96-86FE-0099C953F73C}" type="datetimeFigureOut">
               <a:rPr lang="en-US" smtClean="0"/>
               <a:pPr/>
-              <a:t>8/28/2015</a:t>
+              <a:t>9/16/2015</a:t>
             </a:fld>
             <a:endParaRPr lang="en-US"/>
           </a:p>
@@ -2580,7 +2580,7 @@
     </p:spTree>
     <p:extLst>
       <p:ext uri="{BB962C8B-B14F-4D97-AF65-F5344CB8AC3E}">
-        <p14:creationId xmlns:p14="http://schemas.microsoft.com/office/powerpoint/2010/main" xmlns="" val="1090656924"/>
+        <p14:creationId xmlns="" xmlns:p14="http://schemas.microsoft.com/office/powerpoint/2010/main" val="1090656924"/>
       </p:ext>
     </p:extLst>
   </p:cSld>
@@ -2624,8 +2624,8 @@
         </p:nvSpPr>
         <p:spPr>
           <a:xfrm>
-            <a:off x="324011" y="346035"/>
-            <a:ext cx="5832157" cy="1440127"/>
+            <a:off x="396088" y="346039"/>
+            <a:ext cx="7129462" cy="1440127"/>
           </a:xfrm>
           <a:prstGeom prst="rect">
             <a:avLst/>
@@ -2657,8 +2657,8 @@
         </p:nvSpPr>
         <p:spPr>
           <a:xfrm>
-            <a:off x="324011" y="2016180"/>
-            <a:ext cx="5832157" cy="5702504"/>
+            <a:off x="396088" y="2016184"/>
+            <a:ext cx="7129462" cy="5702505"/>
           </a:xfrm>
           <a:prstGeom prst="rect">
             <a:avLst/>
@@ -2719,8 +2719,8 @@
         </p:nvSpPr>
         <p:spPr>
           <a:xfrm>
-            <a:off x="324012" y="8008712"/>
-            <a:ext cx="1512042" cy="460042"/>
+            <a:off x="396085" y="8008714"/>
+            <a:ext cx="1848381" cy="460042"/>
           </a:xfrm>
           <a:prstGeom prst="rect">
             <a:avLst/>
@@ -2743,7 +2743,7 @@
             <a:fld id="{C69E31BE-431C-4F96-86FE-0099C953F73C}" type="datetimeFigureOut">
               <a:rPr lang="en-US" smtClean="0"/>
               <a:pPr/>
-              <a:t>8/28/2015</a:t>
+              <a:t>9/16/2015</a:t>
             </a:fld>
             <a:endParaRPr lang="en-US"/>
           </a:p>
@@ -2761,8 +2761,8 @@
         </p:nvSpPr>
         <p:spPr>
           <a:xfrm>
-            <a:off x="2214063" y="8008712"/>
-            <a:ext cx="2052056" cy="460042"/>
+            <a:off x="2706559" y="8008714"/>
+            <a:ext cx="2508515" cy="460042"/>
           </a:xfrm>
           <a:prstGeom prst="rect">
             <a:avLst/>
@@ -2798,8 +2798,8 @@
         </p:nvSpPr>
         <p:spPr>
           <a:xfrm>
-            <a:off x="4644129" y="8008712"/>
-            <a:ext cx="1512042" cy="460042"/>
+            <a:off x="5677168" y="8008714"/>
+            <a:ext cx="1848381" cy="460042"/>
           </a:xfrm>
           <a:prstGeom prst="rect">
             <a:avLst/>
@@ -2831,7 +2831,7 @@
     </p:spTree>
     <p:extLst>
       <p:ext uri="{BB962C8B-B14F-4D97-AF65-F5344CB8AC3E}">
-        <p14:creationId xmlns:p14="http://schemas.microsoft.com/office/powerpoint/2010/main" xmlns="" val="2194502168"/>
+        <p14:creationId xmlns="" xmlns:p14="http://schemas.microsoft.com/office/powerpoint/2010/main" val="2194502168"/>
       </p:ext>
     </p:extLst>
   </p:cSld>
@@ -3121,14 +3121,14 @@
       </p:grpSpPr>
       <p:sp>
         <p:nvSpPr>
-          <p:cNvPr id="197" name="Rectangle 196"/>
+          <p:cNvPr id="89" name="Rectangle 88"/>
           <p:cNvSpPr/>
           <p:nvPr/>
         </p:nvSpPr>
         <p:spPr>
           <a:xfrm>
-            <a:off x="866896" y="93737"/>
-            <a:ext cx="1556724" cy="447819"/>
+            <a:off x="830308" y="93738"/>
+            <a:ext cx="1556724" cy="447820"/>
           </a:xfrm>
           <a:prstGeom prst="rect">
             <a:avLst/>
@@ -3190,14 +3190,14 @@
       </p:sp>
       <p:sp>
         <p:nvSpPr>
-          <p:cNvPr id="198" name="Rectangle 197"/>
+          <p:cNvPr id="90" name="Rectangle 89"/>
           <p:cNvSpPr/>
           <p:nvPr/>
         </p:nvSpPr>
         <p:spPr>
           <a:xfrm>
-            <a:off x="2423619" y="93737"/>
-            <a:ext cx="1556724" cy="447819"/>
+            <a:off x="2387031" y="93738"/>
+            <a:ext cx="1556724" cy="447820"/>
           </a:xfrm>
           <a:prstGeom prst="rect">
             <a:avLst/>
@@ -3247,14 +3247,14 @@
       </p:sp>
       <p:sp>
         <p:nvSpPr>
-          <p:cNvPr id="199" name="Rectangle 198"/>
+          <p:cNvPr id="91" name="Rectangle 90"/>
           <p:cNvSpPr/>
           <p:nvPr/>
         </p:nvSpPr>
         <p:spPr>
           <a:xfrm>
-            <a:off x="3980345" y="93737"/>
-            <a:ext cx="1556724" cy="447819"/>
+            <a:off x="5499331" y="93738"/>
+            <a:ext cx="1556724" cy="447820"/>
           </a:xfrm>
           <a:prstGeom prst="rect">
             <a:avLst/>
@@ -3293,7 +3293,21 @@
                 <a:ea typeface="ＭＳ Ｐゴシック" pitchFamily="34" charset="-128"/>
                 <a:cs typeface="Calibri" pitchFamily="34" charset="0"/>
               </a:rPr>
-              <a:t>Form Receiver</a:t>
+              <a:t>Form </a:t>
+            </a:r>
+            <a:r>
+              <a:rPr lang="en-US" sz="1200" b="1" dirty="0" smtClean="0">
+                <a:ea typeface="ＭＳ Ｐゴシック" pitchFamily="34" charset="-128"/>
+                <a:cs typeface="Calibri" pitchFamily="34" charset="0"/>
+              </a:rPr>
+              <a:t>Receiver and/or Form </a:t>
+            </a:r>
+            <a:r>
+              <a:rPr lang="en-US" sz="1200" b="1" dirty="0" err="1" smtClean="0">
+                <a:ea typeface="ＭＳ Ｐゴシック" pitchFamily="34" charset="-128"/>
+                <a:cs typeface="Calibri" pitchFamily="34" charset="0"/>
+              </a:rPr>
+              <a:t>Archiver</a:t>
             </a:r>
             <a:endParaRPr lang="en-US" sz="1200" b="1" dirty="0">
               <a:ea typeface="ＭＳ Ｐゴシック" pitchFamily="34" charset="-128"/>
@@ -3304,14 +3318,14 @@
       </p:sp>
       <p:sp>
         <p:nvSpPr>
-          <p:cNvPr id="200" name="Rectangle 199"/>
+          <p:cNvPr id="92" name="Rectangle 91"/>
           <p:cNvSpPr/>
           <p:nvPr/>
         </p:nvSpPr>
         <p:spPr>
           <a:xfrm>
-            <a:off x="866896" y="93732"/>
-            <a:ext cx="1556724" cy="8465834"/>
+            <a:off x="830308" y="93735"/>
+            <a:ext cx="1556724" cy="8465833"/>
           </a:xfrm>
           <a:prstGeom prst="rect">
             <a:avLst/>
@@ -3349,14 +3363,14 @@
       </p:sp>
       <p:sp>
         <p:nvSpPr>
-          <p:cNvPr id="201" name="Rectangle 200"/>
+          <p:cNvPr id="93" name="Rectangle 92"/>
           <p:cNvSpPr/>
           <p:nvPr/>
         </p:nvSpPr>
         <p:spPr>
           <a:xfrm>
-            <a:off x="2423619" y="93732"/>
-            <a:ext cx="1556724" cy="8465834"/>
+            <a:off x="2387031" y="93735"/>
+            <a:ext cx="1556724" cy="8465833"/>
           </a:xfrm>
           <a:prstGeom prst="rect">
             <a:avLst/>
@@ -3394,14 +3408,14 @@
       </p:sp>
       <p:sp>
         <p:nvSpPr>
-          <p:cNvPr id="202" name="Rectangle 201"/>
+          <p:cNvPr id="94" name="Rectangle 93"/>
           <p:cNvSpPr/>
           <p:nvPr/>
         </p:nvSpPr>
         <p:spPr>
           <a:xfrm>
-            <a:off x="3980345" y="93732"/>
-            <a:ext cx="1556724" cy="8465834"/>
+            <a:off x="5499331" y="93735"/>
+            <a:ext cx="1556724" cy="8465833"/>
           </a:xfrm>
           <a:prstGeom prst="rect">
             <a:avLst/>
@@ -3439,13 +3453,13 @@
       </p:sp>
       <p:sp>
         <p:nvSpPr>
-          <p:cNvPr id="203" name="Rounded Rectangle 202"/>
+          <p:cNvPr id="95" name="Rounded Rectangle 94"/>
           <p:cNvSpPr/>
           <p:nvPr/>
         </p:nvSpPr>
         <p:spPr>
           <a:xfrm>
-            <a:off x="1015155" y="5158581"/>
+            <a:off x="978570" y="5158581"/>
             <a:ext cx="1334335" cy="676910"/>
           </a:xfrm>
           <a:prstGeom prst="roundRect">
@@ -3501,13 +3515,13 @@
       </p:sp>
       <p:sp>
         <p:nvSpPr>
-          <p:cNvPr id="204" name="Rounded Rectangle 203"/>
+          <p:cNvPr id="96" name="Rounded Rectangle 95"/>
           <p:cNvSpPr/>
           <p:nvPr/>
         </p:nvSpPr>
         <p:spPr>
           <a:xfrm>
-            <a:off x="5670926" y="7771228"/>
+            <a:off x="7189915" y="7771229"/>
             <a:ext cx="681571" cy="468014"/>
           </a:xfrm>
           <a:prstGeom prst="roundRect">
@@ -3552,13 +3566,13 @@
       </p:sp>
       <p:sp>
         <p:nvSpPr>
-          <p:cNvPr id="205" name="Rounded Rectangle 204"/>
+          <p:cNvPr id="97" name="Rounded Rectangle 96"/>
           <p:cNvSpPr/>
           <p:nvPr/>
         </p:nvSpPr>
         <p:spPr>
           <a:xfrm>
-            <a:off x="1015155" y="6795728"/>
+            <a:off x="978570" y="6795730"/>
             <a:ext cx="1334335" cy="746367"/>
           </a:xfrm>
           <a:prstGeom prst="roundRect">
@@ -3614,13 +3628,13 @@
       </p:sp>
       <p:sp>
         <p:nvSpPr>
-          <p:cNvPr id="206" name="Rounded Rectangle 205"/>
+          <p:cNvPr id="98" name="Rounded Rectangle 97"/>
           <p:cNvSpPr/>
           <p:nvPr/>
         </p:nvSpPr>
         <p:spPr>
           <a:xfrm>
-            <a:off x="4091541" y="6855047"/>
+            <a:off x="5610530" y="6855049"/>
             <a:ext cx="1334335" cy="627729"/>
           </a:xfrm>
           <a:prstGeom prst="roundRect">
@@ -3676,14 +3690,14 @@
       </p:sp>
       <p:sp>
         <p:nvSpPr>
-          <p:cNvPr id="207" name="Rounded Rectangle 206"/>
+          <p:cNvPr id="99" name="Rounded Rectangle 98"/>
           <p:cNvSpPr/>
           <p:nvPr/>
         </p:nvSpPr>
         <p:spPr>
           <a:xfrm>
-            <a:off x="1015155" y="578874"/>
-            <a:ext cx="1334335" cy="970279"/>
+            <a:off x="978570" y="578875"/>
+            <a:ext cx="1334335" cy="970280"/>
           </a:xfrm>
           <a:prstGeom prst="roundRect">
             <a:avLst/>
@@ -3721,19 +3735,8 @@
                 <a:ea typeface="ＭＳ Ｐゴシック" pitchFamily="34" charset="-128"/>
                 <a:cs typeface="Calibri" pitchFamily="34" charset="0"/>
               </a:rPr>
-              <a:t>1. EHR system sends request for </a:t>
-            </a:r>
-            <a:r>
-              <a:rPr lang="en-US" sz="900" b="1" dirty="0" smtClean="0">
-                <a:ea typeface="ＭＳ Ｐゴシック" pitchFamily="34" charset="-128"/>
-                <a:cs typeface="Calibri" pitchFamily="34" charset="0"/>
-              </a:rPr>
-              <a:t>populated Questionnaire Response</a:t>
-            </a:r>
-            <a:endParaRPr lang="en-US" sz="900" b="1" dirty="0" smtClean="0">
-              <a:ea typeface="ＭＳ Ｐゴシック" pitchFamily="34" charset="-128"/>
-              <a:cs typeface="Calibri" pitchFamily="34" charset="0"/>
-            </a:endParaRPr>
+              <a:t>1. EHR system sends request for populated Questionnaire Response</a:t>
+            </a:r>
           </a:p>
           <a:p>
             <a:pPr algn="ctr" defTabSz="446367" fontAlgn="base">
@@ -3781,13 +3784,13 @@
       </p:sp>
       <p:sp>
         <p:nvSpPr>
-          <p:cNvPr id="208" name="Rounded Rectangle 207"/>
+          <p:cNvPr id="100" name="Rounded Rectangle 99"/>
           <p:cNvSpPr/>
           <p:nvPr/>
         </p:nvSpPr>
         <p:spPr>
           <a:xfrm>
-            <a:off x="1015155" y="4497304"/>
+            <a:off x="978570" y="4497304"/>
             <a:ext cx="1334335" cy="597094"/>
           </a:xfrm>
           <a:prstGeom prst="roundRect">
@@ -3843,13 +3846,13 @@
       </p:sp>
       <p:sp>
         <p:nvSpPr>
-          <p:cNvPr id="209" name="Rounded Rectangle 208"/>
+          <p:cNvPr id="101" name="Rounded Rectangle 100"/>
           <p:cNvSpPr/>
           <p:nvPr/>
         </p:nvSpPr>
         <p:spPr>
           <a:xfrm>
-            <a:off x="2571881" y="2682214"/>
+            <a:off x="2535295" y="2682213"/>
             <a:ext cx="1334335" cy="620902"/>
           </a:xfrm>
           <a:prstGeom prst="roundRect">
@@ -3905,14 +3908,14 @@
       </p:sp>
       <p:sp>
         <p:nvSpPr>
-          <p:cNvPr id="210" name="Rounded Rectangle 209"/>
+          <p:cNvPr id="102" name="Rounded Rectangle 101"/>
           <p:cNvSpPr/>
           <p:nvPr/>
         </p:nvSpPr>
         <p:spPr>
           <a:xfrm>
-            <a:off x="1015155" y="3452392"/>
-            <a:ext cx="1334335" cy="925719"/>
+            <a:off x="978570" y="3452393"/>
+            <a:ext cx="1334335" cy="925720"/>
           </a:xfrm>
           <a:prstGeom prst="roundRect">
             <a:avLst/>
@@ -4014,14 +4017,7 @@
                 <a:ea typeface="ＭＳ Ｐゴシック" pitchFamily="34" charset="-128"/>
                 <a:cs typeface="Calibri" pitchFamily="34" charset="0"/>
               </a:rPr>
-              <a:t>EHR-derived </a:t>
-            </a:r>
-            <a:r>
-              <a:rPr lang="en-US" sz="900" b="1" dirty="0" smtClean="0">
-                <a:ea typeface="ＭＳ Ｐゴシック" pitchFamily="34" charset="-128"/>
-                <a:cs typeface="Calibri" pitchFamily="34" charset="0"/>
-              </a:rPr>
-              <a:t>patient data</a:t>
+              <a:t>EHR-derived patient data</a:t>
             </a:r>
             <a:endParaRPr lang="en-US" sz="900" b="1" dirty="0">
               <a:ea typeface="ＭＳ Ｐゴシック" pitchFamily="34" charset="-128"/>
@@ -4032,13 +4028,13 @@
       </p:sp>
       <p:sp>
         <p:nvSpPr>
-          <p:cNvPr id="211" name="Rounded Rectangle 210"/>
+          <p:cNvPr id="103" name="Rounded Rectangle 102"/>
           <p:cNvSpPr/>
           <p:nvPr/>
         </p:nvSpPr>
         <p:spPr>
           <a:xfrm>
-            <a:off x="2571881" y="690830"/>
+            <a:off x="2535295" y="690833"/>
             <a:ext cx="1334335" cy="746367"/>
           </a:xfrm>
           <a:prstGeom prst="roundRect">
@@ -4077,28 +4073,7 @@
                 <a:ea typeface="ＭＳ Ｐゴシック" pitchFamily="34" charset="-128"/>
                 <a:cs typeface="Calibri" pitchFamily="34" charset="0"/>
               </a:rPr>
-              <a:t>2. </a:t>
-            </a:r>
-            <a:r>
-              <a:rPr lang="en-US" sz="900" b="1" dirty="0" smtClean="0">
-                <a:ea typeface="ＭＳ Ｐゴシック" pitchFamily="34" charset="-128"/>
-                <a:cs typeface="Calibri" pitchFamily="34" charset="0"/>
-              </a:rPr>
-              <a:t>Form repository </a:t>
-            </a:r>
-            <a:r>
-              <a:rPr lang="en-US" sz="900" b="1" dirty="0" smtClean="0">
-                <a:ea typeface="ＭＳ Ｐゴシック" pitchFamily="34" charset="-128"/>
-                <a:cs typeface="Calibri" pitchFamily="34" charset="0"/>
-              </a:rPr>
-              <a:t>receives request for </a:t>
-            </a:r>
-            <a:r>
-              <a:rPr lang="en-US" sz="900" b="1" dirty="0" smtClean="0">
-                <a:ea typeface="ＭＳ Ｐゴシック" pitchFamily="34" charset="-128"/>
-                <a:cs typeface="Calibri" pitchFamily="34" charset="0"/>
-              </a:rPr>
-              <a:t>populated Questionnaire Response</a:t>
+              <a:t>2. Form repository receives request for populated Questionnaire Response</a:t>
             </a:r>
             <a:endParaRPr lang="en-US" sz="900" b="1" dirty="0">
               <a:ea typeface="ＭＳ Ｐゴシック" pitchFamily="34" charset="-128"/>
@@ -4109,13 +4084,13 @@
       </p:sp>
       <p:sp>
         <p:nvSpPr>
-          <p:cNvPr id="212" name="Rounded Rectangle 211"/>
+          <p:cNvPr id="104" name="Rounded Rectangle 103"/>
           <p:cNvSpPr/>
           <p:nvPr/>
         </p:nvSpPr>
         <p:spPr>
           <a:xfrm>
-            <a:off x="4091541" y="7632051"/>
+            <a:off x="5610530" y="7632054"/>
             <a:ext cx="1334335" cy="746367"/>
           </a:xfrm>
           <a:prstGeom prst="roundRect">
@@ -4174,16 +4149,16 @@
       </p:sp>
       <p:cxnSp>
         <p:nvCxnSpPr>
-          <p:cNvPr id="213" name="Straight Arrow Connector 212"/>
+          <p:cNvPr id="105" name="Straight Arrow Connector 104"/>
           <p:cNvCxnSpPr>
-            <a:stCxn id="207" idx="3"/>
-            <a:endCxn id="211" idx="1"/>
+            <a:stCxn id="99" idx="3"/>
+            <a:endCxn id="103" idx="1"/>
           </p:cNvCxnSpPr>
           <p:nvPr/>
         </p:nvCxnSpPr>
         <p:spPr>
           <a:xfrm flipV="1">
-            <a:off x="2349491" y="1064013"/>
+            <a:off x="2312903" y="1064013"/>
             <a:ext cx="222390" cy="0"/>
           </a:xfrm>
           <a:prstGeom prst="straightConnector1">
@@ -4210,15 +4185,15 @@
       </p:cxnSp>
       <p:cxnSp>
         <p:nvCxnSpPr>
-          <p:cNvPr id="214" name="Straight Arrow Connector 213"/>
+          <p:cNvPr id="106" name="Straight Arrow Connector 105"/>
           <p:cNvCxnSpPr>
-            <a:endCxn id="209" idx="0"/>
+            <a:endCxn id="101" idx="0"/>
           </p:cNvCxnSpPr>
           <p:nvPr/>
         </p:nvCxnSpPr>
         <p:spPr>
           <a:xfrm>
-            <a:off x="3239047" y="2458303"/>
+            <a:off x="3202459" y="2458306"/>
             <a:ext cx="0" cy="223911"/>
           </a:xfrm>
           <a:prstGeom prst="straightConnector1">
@@ -4245,16 +4220,16 @@
       </p:cxnSp>
       <p:cxnSp>
         <p:nvCxnSpPr>
-          <p:cNvPr id="215" name="Straight Arrow Connector 214"/>
+          <p:cNvPr id="107" name="Straight Arrow Connector 106"/>
           <p:cNvCxnSpPr>
-            <a:stCxn id="209" idx="1"/>
-            <a:endCxn id="222" idx="3"/>
+            <a:stCxn id="101" idx="1"/>
+            <a:endCxn id="114" idx="3"/>
           </p:cNvCxnSpPr>
           <p:nvPr/>
         </p:nvCxnSpPr>
         <p:spPr>
           <a:xfrm flipH="1">
-            <a:off x="2349491" y="2992665"/>
+            <a:off x="2312903" y="2992664"/>
             <a:ext cx="222390" cy="0"/>
           </a:xfrm>
           <a:prstGeom prst="straightConnector1">
@@ -4281,16 +4256,16 @@
       </p:cxnSp>
       <p:cxnSp>
         <p:nvCxnSpPr>
-          <p:cNvPr id="216" name="Straight Arrow Connector 215"/>
+          <p:cNvPr id="108" name="Straight Arrow Connector 107"/>
           <p:cNvCxnSpPr>
-            <a:stCxn id="210" idx="2"/>
-            <a:endCxn id="208" idx="0"/>
+            <a:stCxn id="102" idx="2"/>
+            <a:endCxn id="100" idx="0"/>
           </p:cNvCxnSpPr>
           <p:nvPr/>
         </p:nvCxnSpPr>
         <p:spPr>
           <a:xfrm>
-            <a:off x="1682321" y="4378110"/>
+            <a:off x="1645733" y="4378110"/>
             <a:ext cx="0" cy="119194"/>
           </a:xfrm>
           <a:prstGeom prst="straightConnector1">
@@ -4317,17 +4292,17 @@
       </p:cxnSp>
       <p:cxnSp>
         <p:nvCxnSpPr>
-          <p:cNvPr id="217" name="Straight Arrow Connector 216"/>
+          <p:cNvPr id="109" name="Straight Arrow Connector 108"/>
           <p:cNvCxnSpPr>
-            <a:stCxn id="208" idx="2"/>
-            <a:endCxn id="203" idx="0"/>
+            <a:stCxn id="100" idx="2"/>
+            <a:endCxn id="95" idx="0"/>
           </p:cNvCxnSpPr>
           <p:nvPr/>
         </p:nvCxnSpPr>
         <p:spPr>
           <a:xfrm>
-            <a:off x="1682323" y="5094398"/>
-            <a:ext cx="0" cy="64183"/>
+            <a:off x="1645735" y="5094399"/>
+            <a:ext cx="0" cy="64182"/>
           </a:xfrm>
           <a:prstGeom prst="straightConnector1">
             <a:avLst/>
@@ -4353,16 +4328,16 @@
       </p:cxnSp>
       <p:cxnSp>
         <p:nvCxnSpPr>
-          <p:cNvPr id="218" name="Straight Arrow Connector 217"/>
+          <p:cNvPr id="110" name="Straight Arrow Connector 109"/>
           <p:cNvCxnSpPr>
-            <a:stCxn id="203" idx="2"/>
-            <a:endCxn id="226" idx="0"/>
+            <a:stCxn id="95" idx="2"/>
+            <a:endCxn id="118" idx="0"/>
           </p:cNvCxnSpPr>
           <p:nvPr/>
         </p:nvCxnSpPr>
         <p:spPr>
           <a:xfrm>
-            <a:off x="1682323" y="5835491"/>
+            <a:off x="1645735" y="5835491"/>
             <a:ext cx="0" cy="154550"/>
           </a:xfrm>
           <a:prstGeom prst="straightConnector1">
@@ -4389,17 +4364,17 @@
       </p:cxnSp>
       <p:cxnSp>
         <p:nvCxnSpPr>
-          <p:cNvPr id="219" name="Straight Arrow Connector 218"/>
+          <p:cNvPr id="111" name="Straight Arrow Connector 110"/>
           <p:cNvCxnSpPr>
-            <a:stCxn id="205" idx="3"/>
-            <a:endCxn id="206" idx="1"/>
+            <a:stCxn id="97" idx="3"/>
+            <a:endCxn id="98" idx="1"/>
           </p:cNvCxnSpPr>
           <p:nvPr/>
         </p:nvCxnSpPr>
         <p:spPr>
           <a:xfrm>
-            <a:off x="2349492" y="7168911"/>
-            <a:ext cx="1742050" cy="0"/>
+            <a:off x="2312905" y="7168914"/>
+            <a:ext cx="3297625" cy="0"/>
           </a:xfrm>
           <a:prstGeom prst="straightConnector1">
             <a:avLst/>
@@ -4425,16 +4400,16 @@
       </p:cxnSp>
       <p:cxnSp>
         <p:nvCxnSpPr>
-          <p:cNvPr id="220" name="Straight Arrow Connector 219"/>
+          <p:cNvPr id="112" name="Straight Arrow Connector 111"/>
           <p:cNvCxnSpPr>
-            <a:stCxn id="206" idx="2"/>
-            <a:endCxn id="212" idx="0"/>
+            <a:stCxn id="98" idx="2"/>
+            <a:endCxn id="104" idx="0"/>
           </p:cNvCxnSpPr>
           <p:nvPr/>
         </p:nvCxnSpPr>
         <p:spPr>
           <a:xfrm>
-            <a:off x="4758707" y="7482776"/>
+            <a:off x="6277693" y="7482779"/>
             <a:ext cx="0" cy="149273"/>
           </a:xfrm>
           <a:prstGeom prst="straightConnector1">
@@ -4461,16 +4436,16 @@
       </p:cxnSp>
       <p:cxnSp>
         <p:nvCxnSpPr>
-          <p:cNvPr id="221" name="Straight Arrow Connector 220"/>
+          <p:cNvPr id="113" name="Straight Arrow Connector 112"/>
           <p:cNvCxnSpPr>
-            <a:stCxn id="212" idx="3"/>
-            <a:endCxn id="204" idx="1"/>
+            <a:stCxn id="104" idx="3"/>
+            <a:endCxn id="96" idx="1"/>
           </p:cNvCxnSpPr>
           <p:nvPr/>
         </p:nvCxnSpPr>
         <p:spPr>
           <a:xfrm>
-            <a:off x="5425877" y="8005232"/>
+            <a:off x="6944866" y="8005232"/>
             <a:ext cx="245049" cy="0"/>
           </a:xfrm>
           <a:prstGeom prst="straightConnector1">
@@ -4497,13 +4472,13 @@
       </p:cxnSp>
       <p:sp>
         <p:nvSpPr>
-          <p:cNvPr id="222" name="Rounded Rectangle 221"/>
+          <p:cNvPr id="114" name="Rounded Rectangle 113"/>
           <p:cNvSpPr/>
           <p:nvPr/>
         </p:nvSpPr>
         <p:spPr>
           <a:xfrm>
-            <a:off x="1015155" y="2682214"/>
+            <a:off x="978570" y="2682213"/>
             <a:ext cx="1334335" cy="620902"/>
           </a:xfrm>
           <a:prstGeom prst="roundRect">
@@ -4559,16 +4534,16 @@
       </p:sp>
       <p:cxnSp>
         <p:nvCxnSpPr>
-          <p:cNvPr id="223" name="Straight Arrow Connector 222"/>
+          <p:cNvPr id="115" name="Straight Arrow Connector 114"/>
           <p:cNvCxnSpPr>
-            <a:stCxn id="222" idx="2"/>
-            <a:endCxn id="210" idx="0"/>
+            <a:stCxn id="114" idx="2"/>
+            <a:endCxn id="102" idx="0"/>
           </p:cNvCxnSpPr>
           <p:nvPr/>
         </p:nvCxnSpPr>
         <p:spPr>
           <a:xfrm>
-            <a:off x="1682321" y="3303115"/>
+            <a:off x="1645733" y="3303117"/>
             <a:ext cx="0" cy="149273"/>
           </a:xfrm>
           <a:prstGeom prst="straightConnector1">
@@ -4595,14 +4570,14 @@
       </p:cxnSp>
       <p:sp>
         <p:nvSpPr>
-          <p:cNvPr id="224" name="Rounded Rectangle 223"/>
+          <p:cNvPr id="116" name="Rounded Rectangle 115"/>
           <p:cNvSpPr/>
           <p:nvPr/>
         </p:nvSpPr>
         <p:spPr>
           <a:xfrm>
-            <a:off x="2571881" y="1586473"/>
-            <a:ext cx="1334335" cy="925719"/>
+            <a:off x="2535295" y="1586474"/>
+            <a:ext cx="1334335" cy="925720"/>
           </a:xfrm>
           <a:prstGeom prst="roundRect">
             <a:avLst/>
@@ -4704,14 +4679,7 @@
                 <a:ea typeface="ＭＳ Ｐゴシック" pitchFamily="34" charset="-128"/>
                 <a:cs typeface="Calibri" pitchFamily="34" charset="0"/>
               </a:rPr>
-              <a:t>EHR-provided </a:t>
-            </a:r>
-            <a:r>
-              <a:rPr lang="en-US" sz="900" b="1" dirty="0" smtClean="0">
-                <a:ea typeface="ＭＳ Ｐゴシック" pitchFamily="34" charset="-128"/>
-                <a:cs typeface="Calibri" pitchFamily="34" charset="0"/>
-              </a:rPr>
-              <a:t>patient data</a:t>
+              <a:t>EHR-provided patient data</a:t>
             </a:r>
             <a:endParaRPr lang="en-US" sz="900" b="1" dirty="0">
               <a:ea typeface="ＭＳ Ｐゴシック" pitchFamily="34" charset="-128"/>
@@ -4722,16 +4690,16 @@
       </p:sp>
       <p:cxnSp>
         <p:nvCxnSpPr>
-          <p:cNvPr id="225" name="Straight Arrow Connector 224"/>
+          <p:cNvPr id="117" name="Straight Arrow Connector 116"/>
           <p:cNvCxnSpPr>
-            <a:stCxn id="211" idx="2"/>
-            <a:endCxn id="224" idx="0"/>
+            <a:stCxn id="103" idx="2"/>
+            <a:endCxn id="116" idx="0"/>
           </p:cNvCxnSpPr>
           <p:nvPr/>
         </p:nvCxnSpPr>
         <p:spPr>
           <a:xfrm>
-            <a:off x="3239047" y="1437196"/>
+            <a:off x="3202459" y="1437198"/>
             <a:ext cx="0" cy="149273"/>
           </a:xfrm>
           <a:prstGeom prst="straightConnector1">
@@ -4758,13 +4726,13 @@
       </p:cxnSp>
       <p:sp>
         <p:nvSpPr>
-          <p:cNvPr id="226" name="Rounded Rectangle 225"/>
+          <p:cNvPr id="118" name="Rounded Rectangle 117"/>
           <p:cNvSpPr/>
           <p:nvPr/>
         </p:nvSpPr>
         <p:spPr>
           <a:xfrm>
-            <a:off x="1015155" y="5990041"/>
+            <a:off x="978570" y="5990040"/>
             <a:ext cx="1334335" cy="597094"/>
           </a:xfrm>
           <a:prstGeom prst="roundRect">
@@ -4817,16 +4785,16 @@
       </p:sp>
       <p:cxnSp>
         <p:nvCxnSpPr>
-          <p:cNvPr id="227" name="Straight Arrow Connector 226"/>
+          <p:cNvPr id="119" name="Straight Arrow Connector 118"/>
           <p:cNvCxnSpPr>
-            <a:stCxn id="226" idx="2"/>
-            <a:endCxn id="205" idx="0"/>
+            <a:stCxn id="118" idx="2"/>
+            <a:endCxn id="97" idx="0"/>
           </p:cNvCxnSpPr>
           <p:nvPr/>
         </p:nvCxnSpPr>
         <p:spPr>
           <a:xfrm>
-            <a:off x="1682321" y="6587132"/>
+            <a:off x="1645733" y="6587132"/>
             <a:ext cx="0" cy="208594"/>
           </a:xfrm>
           <a:prstGeom prst="straightConnector1">
@@ -4853,13 +4821,13 @@
       </p:cxnSp>
       <p:sp>
         <p:nvSpPr>
-          <p:cNvPr id="228" name="Rounded Rectangle 227"/>
+          <p:cNvPr id="120" name="Rounded Rectangle 119"/>
           <p:cNvSpPr/>
           <p:nvPr/>
         </p:nvSpPr>
         <p:spPr>
           <a:xfrm>
-            <a:off x="111197" y="830006"/>
+            <a:off x="74612" y="830006"/>
             <a:ext cx="681571" cy="468014"/>
           </a:xfrm>
           <a:prstGeom prst="roundRect">
@@ -4911,16 +4879,16 @@
       </p:sp>
       <p:cxnSp>
         <p:nvCxnSpPr>
-          <p:cNvPr id="229" name="Straight Arrow Connector 228"/>
+          <p:cNvPr id="121" name="Straight Arrow Connector 120"/>
           <p:cNvCxnSpPr>
-            <a:stCxn id="228" idx="3"/>
-            <a:endCxn id="207" idx="1"/>
+            <a:stCxn id="120" idx="3"/>
+            <a:endCxn id="99" idx="1"/>
           </p:cNvCxnSpPr>
           <p:nvPr/>
         </p:nvCxnSpPr>
         <p:spPr>
           <a:xfrm>
-            <a:off x="792765" y="1064013"/>
+            <a:off x="756177" y="1064013"/>
             <a:ext cx="222390" cy="0"/>
           </a:xfrm>
           <a:prstGeom prst="straightConnector1">
@@ -4945,10 +4913,286 @@
           </a:fontRef>
         </p:style>
       </p:cxnSp>
+      <p:sp>
+        <p:nvSpPr>
+          <p:cNvPr id="122" name="Rectangle 121"/>
+          <p:cNvSpPr/>
+          <p:nvPr/>
+        </p:nvSpPr>
+        <p:spPr>
+          <a:xfrm>
+            <a:off x="3945835" y="102087"/>
+            <a:ext cx="1556724" cy="447820"/>
+          </a:xfrm>
+          <a:prstGeom prst="rect">
+            <a:avLst/>
+          </a:prstGeom>
+          <a:solidFill>
+            <a:schemeClr val="accent4">
+              <a:lumMod val="20000"/>
+              <a:lumOff val="80000"/>
+              <a:alpha val="89804"/>
+            </a:schemeClr>
+          </a:solidFill>
+          <a:ln w="9525" cap="flat" cmpd="sng" algn="ctr">
+            <a:noFill/>
+            <a:prstDash val="solid"/>
+            <a:round/>
+            <a:headEnd type="none" w="med" len="med"/>
+            <a:tailEnd type="none" w="med" len="med"/>
+          </a:ln>
+          <a:effectLst/>
+        </p:spPr>
+        <p:txBody>
+          <a:bodyPr lIns="89274" tIns="44638" rIns="89274" bIns="44638" anchor="ctr"/>
+          <a:lstStyle/>
+          <a:p>
+            <a:pPr algn="ctr" defTabSz="446367" fontAlgn="base">
+              <a:lnSpc>
+                <a:spcPct val="80000"/>
+              </a:lnSpc>
+              <a:spcBef>
+                <a:spcPct val="0"/>
+              </a:spcBef>
+              <a:spcAft>
+                <a:spcPct val="0"/>
+              </a:spcAft>
+            </a:pPr>
+            <a:r>
+              <a:rPr lang="en-US" sz="1200" b="1" dirty="0" smtClean="0">
+                <a:ea typeface="ＭＳ Ｐゴシック" pitchFamily="34" charset="-128"/>
+                <a:cs typeface="Calibri" pitchFamily="34" charset="0"/>
+              </a:rPr>
+              <a:t>Data Element Repository</a:t>
+            </a:r>
+            <a:endParaRPr lang="en-US" sz="1200" b="1" dirty="0">
+              <a:ea typeface="ＭＳ Ｐゴシック" pitchFamily="34" charset="-128"/>
+              <a:cs typeface="Calibri" pitchFamily="34" charset="0"/>
+            </a:endParaRPr>
+          </a:p>
+        </p:txBody>
+      </p:sp>
+      <p:sp>
+        <p:nvSpPr>
+          <p:cNvPr id="123" name="Rectangle 122"/>
+          <p:cNvSpPr/>
+          <p:nvPr/>
+        </p:nvSpPr>
+        <p:spPr>
+          <a:xfrm>
+            <a:off x="3945835" y="102084"/>
+            <a:ext cx="1556724" cy="8465833"/>
+          </a:xfrm>
+          <a:prstGeom prst="rect">
+            <a:avLst/>
+          </a:prstGeom>
+          <a:ln>
+            <a:solidFill>
+              <a:schemeClr val="bg1">
+                <a:lumMod val="75000"/>
+              </a:schemeClr>
+            </a:solidFill>
+          </a:ln>
+        </p:spPr>
+        <p:style>
+          <a:lnRef idx="1">
+            <a:schemeClr val="accent1"/>
+          </a:lnRef>
+          <a:fillRef idx="0">
+            <a:schemeClr val="accent1"/>
+          </a:fillRef>
+          <a:effectRef idx="0">
+            <a:schemeClr val="accent1"/>
+          </a:effectRef>
+          <a:fontRef idx="minor">
+            <a:schemeClr val="tx1"/>
+          </a:fontRef>
+        </p:style>
+        <p:txBody>
+          <a:bodyPr lIns="89274" tIns="44638" rIns="89274" bIns="44638" rtlCol="0" anchor="ctr"/>
+          <a:lstStyle/>
+          <a:p>
+            <a:pPr algn="ctr"/>
+            <a:endParaRPr lang="en-US" dirty="0"/>
+          </a:p>
+        </p:txBody>
+      </p:sp>
+      <p:sp>
+        <p:nvSpPr>
+          <p:cNvPr id="124" name="Rounded Rectangle 123"/>
+          <p:cNvSpPr/>
+          <p:nvPr/>
+        </p:nvSpPr>
+        <p:spPr>
+          <a:xfrm>
+            <a:off x="4041699" y="2521077"/>
+            <a:ext cx="1334335" cy="925720"/>
+          </a:xfrm>
+          <a:prstGeom prst="roundRect">
+            <a:avLst/>
+          </a:prstGeom>
+          <a:solidFill>
+            <a:schemeClr val="tx2">
+              <a:lumMod val="20000"/>
+              <a:lumOff val="80000"/>
+              <a:alpha val="89804"/>
+            </a:schemeClr>
+          </a:solidFill>
+          <a:ln w="9525" cap="flat" cmpd="sng" algn="ctr">
+            <a:noFill/>
+            <a:prstDash val="solid"/>
+            <a:round/>
+            <a:headEnd type="none" w="med" len="med"/>
+            <a:tailEnd type="none" w="med" len="med"/>
+          </a:ln>
+          <a:effectLst/>
+        </p:spPr>
+        <p:txBody>
+          <a:bodyPr lIns="89274" tIns="44638" rIns="89274" bIns="44638" anchor="ctr"/>
+          <a:lstStyle/>
+          <a:p>
+            <a:pPr algn="ctr" defTabSz="446367" fontAlgn="base">
+              <a:spcBef>
+                <a:spcPct val="0"/>
+              </a:spcBef>
+              <a:spcAft>
+                <a:spcPct val="0"/>
+              </a:spcAft>
+            </a:pPr>
+            <a:r>
+              <a:rPr lang="en-US" sz="900" b="1" i="1" dirty="0" smtClean="0">
+                <a:solidFill>
+                  <a:schemeClr val="tx2">
+                    <a:lumMod val="40000"/>
+                    <a:lumOff val="60000"/>
+                  </a:schemeClr>
+                </a:solidFill>
+                <a:ea typeface="ＭＳ Ｐゴシック" pitchFamily="34" charset="-128"/>
+                <a:cs typeface="Calibri" pitchFamily="34" charset="0"/>
+              </a:rPr>
+              <a:t>2(b)/4(b). </a:t>
+            </a:r>
+            <a:r>
+              <a:rPr lang="en-US" sz="900" b="1" i="1" dirty="0" smtClean="0">
+                <a:solidFill>
+                  <a:schemeClr val="tx2">
+                    <a:lumMod val="40000"/>
+                    <a:lumOff val="60000"/>
+                  </a:schemeClr>
+                </a:solidFill>
+                <a:ea typeface="ＭＳ Ｐゴシック" pitchFamily="34" charset="-128"/>
+                <a:cs typeface="Calibri" pitchFamily="34" charset="0"/>
+              </a:rPr>
+              <a:t>CONDITIONAL FUNCTIONALITY</a:t>
+            </a:r>
+          </a:p>
+          <a:p>
+            <a:pPr algn="ctr" defTabSz="446367" fontAlgn="base">
+              <a:spcBef>
+                <a:spcPct val="0"/>
+              </a:spcBef>
+              <a:spcAft>
+                <a:spcPct val="0"/>
+              </a:spcAft>
+            </a:pPr>
+            <a:r>
+              <a:rPr lang="en-US" sz="900" b="1" dirty="0" smtClean="0">
+                <a:ea typeface="ＭＳ Ｐゴシック" pitchFamily="34" charset="-128"/>
+                <a:cs typeface="Calibri" pitchFamily="34" charset="0"/>
+              </a:rPr>
+              <a:t>Look up Data Elements to support pre-population</a:t>
+            </a:r>
+            <a:endParaRPr lang="en-US" sz="900" b="1" dirty="0">
+              <a:ea typeface="ＭＳ Ｐゴシック" pitchFamily="34" charset="-128"/>
+              <a:cs typeface="Calibri" pitchFamily="34" charset="0"/>
+            </a:endParaRPr>
+          </a:p>
+        </p:txBody>
+      </p:sp>
+      <p:cxnSp>
+        <p:nvCxnSpPr>
+          <p:cNvPr id="125" name="Shape 124"/>
+          <p:cNvCxnSpPr>
+            <a:stCxn id="116" idx="3"/>
+            <a:endCxn id="124" idx="0"/>
+          </p:cNvCxnSpPr>
+          <p:nvPr/>
+        </p:nvCxnSpPr>
+        <p:spPr>
+          <a:xfrm>
+            <a:off x="3869630" y="2049334"/>
+            <a:ext cx="839237" cy="471743"/>
+          </a:xfrm>
+          <a:prstGeom prst="bentConnector2">
+            <a:avLst/>
+          </a:prstGeom>
+          <a:ln>
+            <a:solidFill>
+              <a:schemeClr val="tx1"/>
+            </a:solidFill>
+            <a:headEnd type="none" w="med" len="med"/>
+            <a:tailEnd type="triangle" w="med" len="med"/>
+          </a:ln>
+        </p:spPr>
+        <p:style>
+          <a:lnRef idx="1">
+            <a:schemeClr val="accent1"/>
+          </a:lnRef>
+          <a:fillRef idx="0">
+            <a:schemeClr val="accent1"/>
+          </a:fillRef>
+          <a:effectRef idx="0">
+            <a:schemeClr val="accent1"/>
+          </a:effectRef>
+          <a:fontRef idx="minor">
+            <a:schemeClr val="tx1"/>
+          </a:fontRef>
+        </p:style>
+      </p:cxnSp>
+      <p:cxnSp>
+        <p:nvCxnSpPr>
+          <p:cNvPr id="126" name="Shape 125"/>
+          <p:cNvCxnSpPr>
+            <a:stCxn id="102" idx="3"/>
+            <a:endCxn id="124" idx="2"/>
+          </p:cNvCxnSpPr>
+          <p:nvPr/>
+        </p:nvCxnSpPr>
+        <p:spPr>
+          <a:xfrm flipV="1">
+            <a:off x="2312905" y="3446797"/>
+            <a:ext cx="2395962" cy="468456"/>
+          </a:xfrm>
+          <a:prstGeom prst="bentConnector2">
+            <a:avLst/>
+          </a:prstGeom>
+          <a:ln>
+            <a:solidFill>
+              <a:schemeClr val="tx1"/>
+            </a:solidFill>
+            <a:headEnd type="none" w="med" len="med"/>
+            <a:tailEnd type="triangle" w="med" len="med"/>
+          </a:ln>
+        </p:spPr>
+        <p:style>
+          <a:lnRef idx="1">
+            <a:schemeClr val="accent1"/>
+          </a:lnRef>
+          <a:fillRef idx="0">
+            <a:schemeClr val="accent1"/>
+          </a:fillRef>
+          <a:effectRef idx="0">
+            <a:schemeClr val="accent1"/>
+          </a:effectRef>
+          <a:fontRef idx="minor">
+            <a:schemeClr val="tx1"/>
+          </a:fontRef>
+        </p:style>
+      </p:cxnSp>
     </p:spTree>
     <p:extLst>
       <p:ext uri="{BB962C8B-B14F-4D97-AF65-F5344CB8AC3E}">
-        <p14:creationId xmlns:p14="http://schemas.microsoft.com/office/powerpoint/2010/main" xmlns="" val="779856399"/>
+        <p14:creationId xmlns="" xmlns:p14="http://schemas.microsoft.com/office/powerpoint/2010/main" val="779856399"/>
       </p:ext>
     </p:extLst>
   </p:cSld>
@@ -5244,12 +5488,9 @@
 </file>
 
 <file path=customXml/item1.xml><?xml version="1.0" encoding="utf-8"?>
-<?mso-contentType ?>
-<FormTemplates xmlns="http://schemas.microsoft.com/sharepoint/v3/contenttype/forms">
-  <Display>DocumentLibraryForm</Display>
-  <Edit>DocumentLibraryForm</Edit>
-  <New>DocumentLibraryForm</New>
-</FormTemplates>
+<p:properties xmlns:p="http://schemas.microsoft.com/office/2006/metadata/properties" xmlns:xsi="http://www.w3.org/2001/XMLSchema-instance">
+  <documentManagement/>
+</p:properties>
 </file>
 
 <file path=customXml/item2.xml><?xml version="1.0" encoding="utf-8"?>
@@ -5302,15 +5543,24 @@
 </file>
 
 <file path=customXml/item3.xml><?xml version="1.0" encoding="utf-8"?>
-<p:properties xmlns:p="http://schemas.microsoft.com/office/2006/metadata/properties" xmlns:xsi="http://www.w3.org/2001/XMLSchema-instance">
-  <documentManagement/>
-</p:properties>
+<?mso-contentType ?>
+<FormTemplates xmlns="http://schemas.microsoft.com/sharepoint/v3/contenttype/forms">
+  <Display>DocumentLibraryForm</Display>
+  <Edit>DocumentLibraryForm</Edit>
+  <New>DocumentLibraryForm</New>
+</FormTemplates>
 </file>
 
 <file path=customXml/itemProps1.xml><?xml version="1.0" encoding="utf-8"?>
-<ds:datastoreItem xmlns:ds="http://schemas.openxmlformats.org/officeDocument/2006/customXml" ds:itemID="{93867DCD-913B-4BE7-B218-6A941DDB47CC}">
+<ds:datastoreItem xmlns:ds="http://schemas.openxmlformats.org/officeDocument/2006/customXml" ds:itemID="{AA05AFCB-176E-411D-8F54-3F7328DC8DF9}">
   <ds:schemaRefs>
-    <ds:schemaRef ds:uri="http://schemas.microsoft.com/sharepoint/v3/contenttype/forms"/>
+    <ds:schemaRef ds:uri="http://schemas.microsoft.com/office/2006/documentManagement/types"/>
+    <ds:schemaRef ds:uri="http://purl.org/dc/terms/"/>
+    <ds:schemaRef ds:uri="http://schemas.microsoft.com/office/2006/metadata/properties"/>
+    <ds:schemaRef ds:uri="http://purl.org/dc/dcmitype/"/>
+    <ds:schemaRef ds:uri="http://www.w3.org/XML/1998/namespace"/>
+    <ds:schemaRef ds:uri="http://schemas.openxmlformats.org/package/2006/metadata/core-properties"/>
+    <ds:schemaRef ds:uri="http://purl.org/dc/elements/1.1/"/>
   </ds:schemaRefs>
 </ds:datastoreItem>
 </file>
@@ -5331,15 +5581,9 @@
 </file>
 
 <file path=customXml/itemProps3.xml><?xml version="1.0" encoding="utf-8"?>
-<ds:datastoreItem xmlns:ds="http://schemas.openxmlformats.org/officeDocument/2006/customXml" ds:itemID="{AA05AFCB-176E-411D-8F54-3F7328DC8DF9}">
+<ds:datastoreItem xmlns:ds="http://schemas.openxmlformats.org/officeDocument/2006/customXml" ds:itemID="{93867DCD-913B-4BE7-B218-6A941DDB47CC}">
   <ds:schemaRefs>
-    <ds:schemaRef ds:uri="http://schemas.microsoft.com/office/2006/documentManagement/types"/>
-    <ds:schemaRef ds:uri="http://purl.org/dc/terms/"/>
-    <ds:schemaRef ds:uri="http://schemas.microsoft.com/office/2006/metadata/properties"/>
-    <ds:schemaRef ds:uri="http://purl.org/dc/dcmitype/"/>
-    <ds:schemaRef ds:uri="http://www.w3.org/XML/1998/namespace"/>
-    <ds:schemaRef ds:uri="http://schemas.openxmlformats.org/package/2006/metadata/core-properties"/>
-    <ds:schemaRef ds:uri="http://purl.org/dc/elements/1.1/"/>
+    <ds:schemaRef ds:uri="http://schemas.microsoft.com/sharepoint/v3/contenttype/forms"/>
   </ds:schemaRefs>
 </ds:datastoreItem>
 </file>
</xml_diff>